<commit_message>
added shopwise pptx doc
</commit_message>
<xml_diff>
--- a/Shopwise - OHW.pptx
+++ b/Shopwise - OHW.pptx
@@ -13,16 +13,17 @@
     <p:sldId id="258" r:id="rId8"/>
     <p:sldId id="259" r:id="rId9"/>
     <p:sldId id="260" r:id="rId10"/>
+    <p:sldId id="261" r:id="rId11"/>
   </p:sldIdLst>
   <p:sldSz cy="5143500" cx="9144000"/>
   <p:notesSz cx="6858000" cy="9144000"/>
   <p:embeddedFontLst>
     <p:embeddedFont>
       <p:font typeface="Roboto"/>
-      <p:regular r:id="rId11"/>
-      <p:bold r:id="rId12"/>
-      <p:italic r:id="rId13"/>
-      <p:boldItalic r:id="rId14"/>
+      <p:regular r:id="rId12"/>
+      <p:bold r:id="rId13"/>
+      <p:italic r:id="rId14"/>
+      <p:boldItalic r:id="rId15"/>
     </p:embeddedFont>
   </p:embeddedFontLst>
   <p:defaultTextStyle>
@@ -718,7 +719,106 @@
       </p:grpSpPr>
       <p:sp>
         <p:nvSpPr>
-          <p:cNvPr id="97" name="Google Shape;97;p:notes"/>
+          <p:cNvPr id="97" name="Google Shape;97;g5effcbe19c_0_0:notes"/>
+          <p:cNvSpPr/>
+          <p:nvPr>
+            <p:ph idx="2" type="sldImg"/>
+          </p:nvPr>
+        </p:nvSpPr>
+        <p:spPr>
+          <a:xfrm>
+            <a:off x="381300" y="685800"/>
+            <a:ext cx="6096000" cy="3429000"/>
+          </a:xfrm>
+          <a:custGeom>
+            <a:rect b="b" l="l" r="r" t="t"/>
+            <a:pathLst>
+              <a:path extrusionOk="0" h="120000" w="120000">
+                <a:moveTo>
+                  <a:pt x="0" y="0"/>
+                </a:moveTo>
+                <a:lnTo>
+                  <a:pt x="120000" y="0"/>
+                </a:lnTo>
+                <a:lnTo>
+                  <a:pt x="120000" y="120000"/>
+                </a:lnTo>
+                <a:lnTo>
+                  <a:pt x="0" y="120000"/>
+                </a:lnTo>
+                <a:close/>
+              </a:path>
+            </a:pathLst>
+          </a:custGeom>
+        </p:spPr>
+      </p:sp>
+      <p:sp>
+        <p:nvSpPr>
+          <p:cNvPr id="98" name="Google Shape;98;g5effcbe19c_0_0:notes"/>
+          <p:cNvSpPr txBox="1"/>
+          <p:nvPr>
+            <p:ph idx="1" type="body"/>
+          </p:nvPr>
+        </p:nvSpPr>
+        <p:spPr>
+          <a:xfrm>
+            <a:off x="685800" y="4343400"/>
+            <a:ext cx="5486400" cy="4114800"/>
+          </a:xfrm>
+          <a:prstGeom prst="rect">
+            <a:avLst/>
+          </a:prstGeom>
+        </p:spPr>
+        <p:txBody>
+          <a:bodyPr anchorCtr="0" anchor="t" bIns="91425" lIns="91425" spcFirstLastPara="1" rIns="91425" wrap="square" tIns="91425">
+            <a:noAutofit/>
+          </a:bodyPr>
+          <a:lstStyle/>
+          <a:p>
+            <a:pPr indent="0" lvl="0" marL="0" rtl="0" algn="l">
+              <a:spcBef>
+                <a:spcPts val="0"/>
+              </a:spcBef>
+              <a:spcAft>
+                <a:spcPts val="0"/>
+              </a:spcAft>
+              <a:buNone/>
+            </a:pPr>
+            <a:r>
+              <a:t/>
+            </a:r>
+            <a:endParaRPr/>
+          </a:p>
+        </p:txBody>
+      </p:sp>
+    </p:spTree>
+  </p:cSld>
+  <p:clrMapOvr>
+    <a:masterClrMapping/>
+  </p:clrMapOvr>
+</p:notes>
+</file>
+
+<file path=ppt/notesSlides/notesSlide2.xml><?xml version="1.0" encoding="utf-8"?>
+<p:notes xmlns:a="http://schemas.openxmlformats.org/drawingml/2006/main" xmlns:r="http://schemas.openxmlformats.org/officeDocument/2006/relationships" xmlns:mc="http://schemas.openxmlformats.org/markup-compatibility/2006" xmlns:mv="urn:schemas-microsoft-com:mac:vml" xmlns:p="http://schemas.openxmlformats.org/presentationml/2006/main" xmlns:c="http://schemas.openxmlformats.org/drawingml/2006/chart" xmlns:dgm="http://schemas.openxmlformats.org/drawingml/2006/diagram" xmlns:o="urn:schemas-microsoft-com:office:office" xmlns:v="urn:schemas-microsoft-com:vml" xmlns:pvml="urn:schemas-microsoft-com:office:powerpoint" xmlns:com="http://schemas.openxmlformats.org/drawingml/2006/compatibility" xmlns:p14="http://schemas.microsoft.com/office/powerpoint/2010/main" xmlns:p15="http://schemas.microsoft.com/office/powerpoint/2012/main" showMasterPhAnim="0" showMasterSp="0">
+  <p:cSld>
+    <p:spTree>
+      <p:nvGrpSpPr>
+        <p:cNvPr id="103" name="Shape 103"/>
+        <p:cNvGrpSpPr/>
+        <p:nvPr/>
+      </p:nvGrpSpPr>
+      <p:grpSpPr>
+        <a:xfrm>
+          <a:off x="0" y="0"/>
+          <a:ext cx="0" cy="0"/>
+          <a:chOff x="0" y="0"/>
+          <a:chExt cx="0" cy="0"/>
+        </a:xfrm>
+      </p:grpSpPr>
+      <p:sp>
+        <p:nvSpPr>
+          <p:cNvPr id="104" name="Google Shape;104;p:notes"/>
           <p:cNvSpPr/>
           <p:nvPr>
             <p:ph idx="2" type="sldImg"/>
@@ -753,7 +853,7 @@
       </p:sp>
       <p:sp>
         <p:nvSpPr>
-          <p:cNvPr id="98" name="Google Shape;98;p:notes"/>
+          <p:cNvPr id="105" name="Google Shape;105;p:notes"/>
           <p:cNvSpPr txBox="1"/>
           <p:nvPr>
             <p:ph idx="1" type="body"/>
@@ -798,12 +898,12 @@
 </p:notes>
 </file>
 
-<file path=ppt/notesSlides/notesSlide2.xml><?xml version="1.0" encoding="utf-8"?>
+<file path=ppt/notesSlides/notesSlide3.xml><?xml version="1.0" encoding="utf-8"?>
 <p:notes xmlns:a="http://schemas.openxmlformats.org/drawingml/2006/main" xmlns:r="http://schemas.openxmlformats.org/officeDocument/2006/relationships" xmlns:mc="http://schemas.openxmlformats.org/markup-compatibility/2006" xmlns:mv="urn:schemas-microsoft-com:mac:vml" xmlns:p="http://schemas.openxmlformats.org/presentationml/2006/main" xmlns:c="http://schemas.openxmlformats.org/drawingml/2006/chart" xmlns:dgm="http://schemas.openxmlformats.org/drawingml/2006/diagram" xmlns:o="urn:schemas-microsoft-com:office:office" xmlns:v="urn:schemas-microsoft-com:vml" xmlns:pvml="urn:schemas-microsoft-com:office:powerpoint" xmlns:com="http://schemas.openxmlformats.org/drawingml/2006/compatibility" xmlns:p14="http://schemas.microsoft.com/office/powerpoint/2010/main" xmlns:p15="http://schemas.microsoft.com/office/powerpoint/2012/main" showMasterPhAnim="0" showMasterSp="0">
   <p:cSld>
     <p:spTree>
       <p:nvGrpSpPr>
-        <p:cNvPr id="101" name="Shape 101"/>
+        <p:cNvPr id="108" name="Shape 108"/>
         <p:cNvGrpSpPr/>
         <p:nvPr/>
       </p:nvGrpSpPr>
@@ -817,7 +917,7 @@
       </p:grpSpPr>
       <p:sp>
         <p:nvSpPr>
-          <p:cNvPr id="102" name="Google Shape;102;g5e6478c547_0_604:notes"/>
+          <p:cNvPr id="109" name="Google Shape;109;g5e6478c547_0_604:notes"/>
           <p:cNvSpPr/>
           <p:nvPr>
             <p:ph idx="2" type="sldImg"/>
@@ -852,7 +952,7 @@
       </p:sp>
       <p:sp>
         <p:nvSpPr>
-          <p:cNvPr id="103" name="Google Shape;103;g5e6478c547_0_604:notes"/>
+          <p:cNvPr id="110" name="Google Shape;110;g5e6478c547_0_604:notes"/>
           <p:cNvSpPr txBox="1"/>
           <p:nvPr>
             <p:ph idx="1" type="body"/>
@@ -897,12 +997,12 @@
 </p:notes>
 </file>
 
-<file path=ppt/notesSlides/notesSlide3.xml><?xml version="1.0" encoding="utf-8"?>
+<file path=ppt/notesSlides/notesSlide4.xml><?xml version="1.0" encoding="utf-8"?>
 <p:notes xmlns:a="http://schemas.openxmlformats.org/drawingml/2006/main" xmlns:r="http://schemas.openxmlformats.org/officeDocument/2006/relationships" xmlns:mc="http://schemas.openxmlformats.org/markup-compatibility/2006" xmlns:mv="urn:schemas-microsoft-com:mac:vml" xmlns:p="http://schemas.openxmlformats.org/presentationml/2006/main" xmlns:c="http://schemas.openxmlformats.org/drawingml/2006/chart" xmlns:dgm="http://schemas.openxmlformats.org/drawingml/2006/diagram" xmlns:o="urn:schemas-microsoft-com:office:office" xmlns:v="urn:schemas-microsoft-com:vml" xmlns:pvml="urn:schemas-microsoft-com:office:powerpoint" xmlns:com="http://schemas.openxmlformats.org/drawingml/2006/compatibility" xmlns:p14="http://schemas.microsoft.com/office/powerpoint/2010/main" xmlns:p15="http://schemas.microsoft.com/office/powerpoint/2012/main" showMasterPhAnim="0" showMasterSp="0">
   <p:cSld>
     <p:spTree>
       <p:nvGrpSpPr>
-        <p:cNvPr id="107" name="Shape 107"/>
+        <p:cNvPr id="114" name="Shape 114"/>
         <p:cNvGrpSpPr/>
         <p:nvPr/>
       </p:nvGrpSpPr>
@@ -916,7 +1016,7 @@
       </p:grpSpPr>
       <p:sp>
         <p:nvSpPr>
-          <p:cNvPr id="108" name="Google Shape;108;g5e6478c547_0_813:notes"/>
+          <p:cNvPr id="115" name="Google Shape;115;g5e6478c547_0_813:notes"/>
           <p:cNvSpPr/>
           <p:nvPr>
             <p:ph idx="2" type="sldImg"/>
@@ -951,7 +1051,7 @@
       </p:sp>
       <p:sp>
         <p:nvSpPr>
-          <p:cNvPr id="109" name="Google Shape;109;g5e6478c547_0_813:notes"/>
+          <p:cNvPr id="116" name="Google Shape;116;g5e6478c547_0_813:notes"/>
           <p:cNvSpPr txBox="1"/>
           <p:nvPr>
             <p:ph idx="1" type="body"/>
@@ -996,12 +1096,12 @@
 </p:notes>
 </file>
 
-<file path=ppt/notesSlides/notesSlide4.xml><?xml version="1.0" encoding="utf-8"?>
+<file path=ppt/notesSlides/notesSlide5.xml><?xml version="1.0" encoding="utf-8"?>
 <p:notes xmlns:a="http://schemas.openxmlformats.org/drawingml/2006/main" xmlns:r="http://schemas.openxmlformats.org/officeDocument/2006/relationships" xmlns:mc="http://schemas.openxmlformats.org/markup-compatibility/2006" xmlns:mv="urn:schemas-microsoft-com:mac:vml" xmlns:p="http://schemas.openxmlformats.org/presentationml/2006/main" xmlns:c="http://schemas.openxmlformats.org/drawingml/2006/chart" xmlns:dgm="http://schemas.openxmlformats.org/drawingml/2006/diagram" xmlns:o="urn:schemas-microsoft-com:office:office" xmlns:v="urn:schemas-microsoft-com:vml" xmlns:pvml="urn:schemas-microsoft-com:office:powerpoint" xmlns:com="http://schemas.openxmlformats.org/drawingml/2006/compatibility" xmlns:p14="http://schemas.microsoft.com/office/powerpoint/2010/main" xmlns:p15="http://schemas.microsoft.com/office/powerpoint/2012/main" showMasterPhAnim="0" showMasterSp="0">
   <p:cSld>
     <p:spTree>
       <p:nvGrpSpPr>
-        <p:cNvPr id="113" name="Shape 113"/>
+        <p:cNvPr id="120" name="Shape 120"/>
         <p:cNvGrpSpPr/>
         <p:nvPr/>
       </p:nvGrpSpPr>
@@ -1015,7 +1115,7 @@
       </p:grpSpPr>
       <p:sp>
         <p:nvSpPr>
-          <p:cNvPr id="114" name="Google Shape;114;g5e6478c547_0_1550:notes"/>
+          <p:cNvPr id="121" name="Google Shape;121;g5e6478c547_0_1550:notes"/>
           <p:cNvSpPr/>
           <p:nvPr>
             <p:ph idx="2" type="sldImg"/>
@@ -1050,7 +1150,7 @@
       </p:sp>
       <p:sp>
         <p:nvSpPr>
-          <p:cNvPr id="115" name="Google Shape;115;g5e6478c547_0_1550:notes"/>
+          <p:cNvPr id="122" name="Google Shape;122;g5e6478c547_0_1550:notes"/>
           <p:cNvSpPr txBox="1"/>
           <p:nvPr>
             <p:ph idx="1" type="body"/>
@@ -1081,7 +1181,7 @@
               <a:buNone/>
             </a:pPr>
             <a:r>
-              <a:rPr lang="en" sz="1400">
+              <a:rPr lang="da" sz="1400">
                 <a:latin typeface="Roboto"/>
                 <a:ea typeface="Roboto"/>
                 <a:cs typeface="Roboto"/>
@@ -1101,12 +1201,12 @@
 </p:notes>
 </file>
 
-<file path=ppt/notesSlides/notesSlide5.xml><?xml version="1.0" encoding="utf-8"?>
+<file path=ppt/notesSlides/notesSlide6.xml><?xml version="1.0" encoding="utf-8"?>
 <p:notes xmlns:a="http://schemas.openxmlformats.org/drawingml/2006/main" xmlns:r="http://schemas.openxmlformats.org/officeDocument/2006/relationships" xmlns:mc="http://schemas.openxmlformats.org/markup-compatibility/2006" xmlns:mv="urn:schemas-microsoft-com:mac:vml" xmlns:p="http://schemas.openxmlformats.org/presentationml/2006/main" xmlns:c="http://schemas.openxmlformats.org/drawingml/2006/chart" xmlns:dgm="http://schemas.openxmlformats.org/drawingml/2006/diagram" xmlns:o="urn:schemas-microsoft-com:office:office" xmlns:v="urn:schemas-microsoft-com:vml" xmlns:pvml="urn:schemas-microsoft-com:office:powerpoint" xmlns:com="http://schemas.openxmlformats.org/drawingml/2006/compatibility" xmlns:p14="http://schemas.microsoft.com/office/powerpoint/2010/main" xmlns:p15="http://schemas.microsoft.com/office/powerpoint/2012/main" showMasterPhAnim="0" showMasterSp="0">
   <p:cSld>
     <p:spTree>
       <p:nvGrpSpPr>
-        <p:cNvPr id="119" name="Shape 119"/>
+        <p:cNvPr id="126" name="Shape 126"/>
         <p:cNvGrpSpPr/>
         <p:nvPr/>
       </p:nvGrpSpPr>
@@ -1120,7 +1220,7 @@
       </p:grpSpPr>
       <p:sp>
         <p:nvSpPr>
-          <p:cNvPr id="120" name="Google Shape;120;g5e6478c547_0_1824:notes"/>
+          <p:cNvPr id="127" name="Google Shape;127;g5e6478c547_0_1824:notes"/>
           <p:cNvSpPr/>
           <p:nvPr>
             <p:ph idx="2" type="sldImg"/>
@@ -1155,7 +1255,7 @@
       </p:sp>
       <p:sp>
         <p:nvSpPr>
-          <p:cNvPr id="121" name="Google Shape;121;g5e6478c547_0_1824:notes"/>
+          <p:cNvPr id="128" name="Google Shape;128;g5e6478c547_0_1824:notes"/>
           <p:cNvSpPr txBox="1"/>
           <p:nvPr>
             <p:ph idx="1" type="body"/>
@@ -1927,7 +2027,7 @@
               <a:buNone/>
             </a:pPr>
             <a:fld id="{00000000-1234-1234-1234-123412341234}" type="slidenum">
-              <a:rPr lang="en"/>
+              <a:rPr lang="da"/>
               <a:t>‹#›</a:t>
             </a:fld>
             <a:endParaRPr/>
@@ -2646,7 +2746,7 @@
               <a:buNone/>
             </a:pPr>
             <a:fld id="{00000000-1234-1234-1234-123412341234}" type="slidenum">
-              <a:rPr lang="en"/>
+              <a:rPr lang="da"/>
               <a:t>‹#›</a:t>
             </a:fld>
             <a:endParaRPr/>
@@ -2784,7 +2884,7 @@
               <a:buNone/>
             </a:pPr>
             <a:fld id="{00000000-1234-1234-1234-123412341234}" type="slidenum">
-              <a:rPr lang="en"/>
+              <a:rPr lang="da"/>
               <a:t>‹#›</a:t>
             </a:fld>
             <a:endParaRPr/>
@@ -3279,7 +3379,7 @@
               <a:buNone/>
             </a:pPr>
             <a:fld id="{00000000-1234-1234-1234-123412341234}" type="slidenum">
-              <a:rPr lang="en"/>
+              <a:rPr lang="da"/>
               <a:t>‹#›</a:t>
             </a:fld>
             <a:endParaRPr/>
@@ -3738,7 +3838,7 @@
               <a:buNone/>
             </a:pPr>
             <a:fld id="{00000000-1234-1234-1234-123412341234}" type="slidenum">
-              <a:rPr lang="en"/>
+              <a:rPr lang="da"/>
               <a:t>‹#›</a:t>
             </a:fld>
             <a:endParaRPr/>
@@ -4230,7 +4330,7 @@
               <a:buNone/>
             </a:pPr>
             <a:fld id="{00000000-1234-1234-1234-123412341234}" type="slidenum">
-              <a:rPr lang="en"/>
+              <a:rPr lang="da"/>
               <a:t>‹#›</a:t>
             </a:fld>
             <a:endParaRPr/>
@@ -4757,7 +4857,7 @@
               <a:buNone/>
             </a:pPr>
             <a:fld id="{00000000-1234-1234-1234-123412341234}" type="slidenum">
-              <a:rPr lang="en"/>
+              <a:rPr lang="da"/>
               <a:t>‹#›</a:t>
             </a:fld>
             <a:endParaRPr/>
@@ -5339,7 +5439,7 @@
               <a:buNone/>
             </a:pPr>
             <a:fld id="{00000000-1234-1234-1234-123412341234}" type="slidenum">
-              <a:rPr lang="en"/>
+              <a:rPr lang="da"/>
               <a:t>‹#›</a:t>
             </a:fld>
             <a:endParaRPr/>
@@ -5852,7 +5952,7 @@
               <a:buNone/>
             </a:pPr>
             <a:fld id="{00000000-1234-1234-1234-123412341234}" type="slidenum">
-              <a:rPr lang="en"/>
+              <a:rPr lang="da"/>
               <a:t>‹#›</a:t>
             </a:fld>
             <a:endParaRPr/>
@@ -6115,7 +6215,7 @@
               <a:buNone/>
             </a:pPr>
             <a:fld id="{00000000-1234-1234-1234-123412341234}" type="slidenum">
-              <a:rPr lang="en"/>
+              <a:rPr lang="da"/>
               <a:t>‹#›</a:t>
             </a:fld>
             <a:endParaRPr/>
@@ -6503,7 +6603,7 @@
               <a:buNone/>
             </a:pPr>
             <a:fld id="{00000000-1234-1234-1234-123412341234}" type="slidenum">
-              <a:rPr lang="en"/>
+              <a:rPr lang="da"/>
               <a:t>‹#›</a:t>
             </a:fld>
             <a:endParaRPr/>
@@ -7030,7 +7130,7 @@
               <a:buNone/>
             </a:pPr>
             <a:fld id="{00000000-1234-1234-1234-123412341234}" type="slidenum">
-              <a:rPr lang="en"/>
+              <a:rPr lang="da"/>
               <a:t>‹#›</a:t>
             </a:fld>
             <a:endParaRPr/>
@@ -7666,7 +7766,7 @@
               <a:buNone/>
             </a:pPr>
             <a:fld id="{00000000-1234-1234-1234-123412341234}" type="slidenum">
-              <a:rPr lang="en"/>
+              <a:rPr lang="da"/>
               <a:t>‹#›</a:t>
             </a:fld>
             <a:endParaRPr/>
@@ -7844,7 +7944,7 @@
               <a:buNone/>
             </a:pPr>
             <a:fld id="{00000000-1234-1234-1234-123412341234}" type="slidenum">
-              <a:rPr lang="en"/>
+              <a:rPr lang="da"/>
               <a:t>‹#›</a:t>
             </a:fld>
             <a:endParaRPr/>
@@ -8530,7 +8630,7 @@
               <a:buNone/>
             </a:pPr>
             <a:fld id="{00000000-1234-1234-1234-123412341234}" type="slidenum">
-              <a:rPr lang="en"/>
+              <a:rPr lang="da"/>
               <a:t>‹#›</a:t>
             </a:fld>
             <a:endParaRPr/>
@@ -9266,9 +9366,161 @@
           <a:chExt cx="0" cy="0"/>
         </a:xfrm>
       </p:grpSpPr>
+      <p:sp>
+        <p:nvSpPr>
+          <p:cNvPr id="100" name="Google Shape;100;p16"/>
+          <p:cNvSpPr txBox="1"/>
+          <p:nvPr>
+            <p:ph type="title"/>
+          </p:nvPr>
+        </p:nvSpPr>
+        <p:spPr>
+          <a:xfrm>
+            <a:off x="363700" y="410000"/>
+            <a:ext cx="8178600" cy="607800"/>
+          </a:xfrm>
+          <a:prstGeom prst="rect">
+            <a:avLst/>
+          </a:prstGeom>
+        </p:spPr>
+        <p:txBody>
+          <a:bodyPr anchorCtr="0" anchor="t" bIns="91425" lIns="91425" spcFirstLastPara="1" rIns="91425" wrap="square" tIns="91425">
+            <a:noAutofit/>
+          </a:bodyPr>
+          <a:lstStyle/>
+          <a:p>
+            <a:pPr indent="0" lvl="0" marL="0" rtl="0" algn="l">
+              <a:spcBef>
+                <a:spcPts val="0"/>
+              </a:spcBef>
+              <a:spcAft>
+                <a:spcPts val="0"/>
+              </a:spcAft>
+              <a:buNone/>
+            </a:pPr>
+            <a:r>
+              <a:rPr lang="da"/>
+              <a:t>Problem Statement</a:t>
+            </a:r>
+            <a:endParaRPr/>
+          </a:p>
+        </p:txBody>
+      </p:sp>
+      <p:sp>
+        <p:nvSpPr>
+          <p:cNvPr id="101" name="Google Shape;101;p16"/>
+          <p:cNvSpPr txBox="1"/>
+          <p:nvPr>
+            <p:ph idx="1" type="body"/>
+          </p:nvPr>
+        </p:nvSpPr>
+        <p:spPr>
+          <a:xfrm>
+            <a:off x="363700" y="1245125"/>
+            <a:ext cx="4147800" cy="3339000"/>
+          </a:xfrm>
+          <a:prstGeom prst="rect">
+            <a:avLst/>
+          </a:prstGeom>
+        </p:spPr>
+        <p:txBody>
+          <a:bodyPr anchorCtr="0" anchor="t" bIns="91425" lIns="91425" spcFirstLastPara="1" rIns="91425" wrap="square" tIns="91425">
+            <a:noAutofit/>
+          </a:bodyPr>
+          <a:lstStyle/>
+          <a:p>
+            <a:pPr indent="0" lvl="0" marL="0" rtl="0" algn="l">
+              <a:spcBef>
+                <a:spcPts val="0"/>
+              </a:spcBef>
+              <a:spcAft>
+                <a:spcPts val="1600"/>
+              </a:spcAft>
+              <a:buNone/>
+            </a:pPr>
+            <a:r>
+              <a:rPr lang="da" sz="2000"/>
+              <a:t>Bringing the retail experience to consumers while </a:t>
+            </a:r>
+            <a:r>
+              <a:rPr lang="da" sz="2000"/>
+              <a:t>simultaneously</a:t>
+            </a:r>
+            <a:r>
+              <a:rPr lang="da" sz="2000"/>
+              <a:t> eliminating the </a:t>
+            </a:r>
+            <a:r>
+              <a:rPr lang="da" sz="2000"/>
+              <a:t>middleman</a:t>
+            </a:r>
+            <a:r>
+              <a:rPr lang="da" sz="2000"/>
+              <a:t> factor</a:t>
+            </a:r>
+            <a:endParaRPr sz="2000"/>
+          </a:p>
+        </p:txBody>
+      </p:sp>
       <p:pic>
         <p:nvPicPr>
-          <p:cNvPr id="100" name="Google Shape;100;p16"/>
+          <p:cNvPr id="102" name="Google Shape;102;p16"/>
+          <p:cNvPicPr preferRelativeResize="0"/>
+          <p:nvPr/>
+        </p:nvPicPr>
+        <p:blipFill>
+          <a:blip r:embed="rId3">
+            <a:alphaModFix/>
+          </a:blip>
+          <a:stretch>
+            <a:fillRect/>
+          </a:stretch>
+        </p:blipFill>
+        <p:spPr>
+          <a:xfrm>
+            <a:off x="4214625" y="544125"/>
+            <a:ext cx="4929375" cy="3685550"/>
+          </a:xfrm>
+          <a:prstGeom prst="rect">
+            <a:avLst/>
+          </a:prstGeom>
+          <a:noFill/>
+          <a:ln>
+            <a:noFill/>
+          </a:ln>
+          <a:effectLst>
+            <a:reflection blurRad="0" dir="5400000" dist="38100" endA="0" endPos="30000" fadeDir="5400012" kx="0" rotWithShape="0" algn="bl" stPos="0" sy="-100000" ky="0"/>
+          </a:effectLst>
+        </p:spPr>
+      </p:pic>
+    </p:spTree>
+  </p:cSld>
+  <p:clrMapOvr>
+    <a:masterClrMapping/>
+  </p:clrMapOvr>
+</p:sld>
+</file>
+
+<file path=ppt/slides/slide2.xml><?xml version="1.0" encoding="utf-8"?>
+<p:sld xmlns:a="http://schemas.openxmlformats.org/drawingml/2006/main" xmlns:r="http://schemas.openxmlformats.org/officeDocument/2006/relationships" xmlns:mc="http://schemas.openxmlformats.org/markup-compatibility/2006" xmlns:mv="urn:schemas-microsoft-com:mac:vml" xmlns:p="http://schemas.openxmlformats.org/presentationml/2006/main" xmlns:c="http://schemas.openxmlformats.org/drawingml/2006/chart" xmlns:dgm="http://schemas.openxmlformats.org/drawingml/2006/diagram" xmlns:o="urn:schemas-microsoft-com:office:office" xmlns:v="urn:schemas-microsoft-com:vml" xmlns:pvml="urn:schemas-microsoft-com:office:powerpoint" xmlns:com="http://schemas.openxmlformats.org/drawingml/2006/compatibility" xmlns:p14="http://schemas.microsoft.com/office/powerpoint/2010/main" xmlns:p15="http://schemas.microsoft.com/office/powerpoint/2012/main">
+  <p:cSld>
+    <p:spTree>
+      <p:nvGrpSpPr>
+        <p:cNvPr id="106" name="Shape 106"/>
+        <p:cNvGrpSpPr/>
+        <p:nvPr/>
+      </p:nvGrpSpPr>
+      <p:grpSpPr>
+        <a:xfrm>
+          <a:off x="0" y="0"/>
+          <a:ext cx="0" cy="0"/>
+          <a:chOff x="0" y="0"/>
+          <a:chExt cx="0" cy="0"/>
+        </a:xfrm>
+      </p:grpSpPr>
+      <p:pic>
+        <p:nvPicPr>
+          <p:cNvPr id="107" name="Google Shape;107;p17"/>
           <p:cNvPicPr preferRelativeResize="0"/>
           <p:nvPr/>
         </p:nvPicPr>
@@ -9301,12 +9553,12 @@
 </p:sld>
 </file>
 
-<file path=ppt/slides/slide2.xml><?xml version="1.0" encoding="utf-8"?>
+<file path=ppt/slides/slide3.xml><?xml version="1.0" encoding="utf-8"?>
 <p:sld xmlns:a="http://schemas.openxmlformats.org/drawingml/2006/main" xmlns:r="http://schemas.openxmlformats.org/officeDocument/2006/relationships" xmlns:mc="http://schemas.openxmlformats.org/markup-compatibility/2006" xmlns:mv="urn:schemas-microsoft-com:mac:vml" xmlns:p="http://schemas.openxmlformats.org/presentationml/2006/main" xmlns:c="http://schemas.openxmlformats.org/drawingml/2006/chart" xmlns:dgm="http://schemas.openxmlformats.org/drawingml/2006/diagram" xmlns:o="urn:schemas-microsoft-com:office:office" xmlns:v="urn:schemas-microsoft-com:vml" xmlns:pvml="urn:schemas-microsoft-com:office:powerpoint" xmlns:com="http://schemas.openxmlformats.org/drawingml/2006/compatibility" xmlns:p14="http://schemas.microsoft.com/office/powerpoint/2010/main" xmlns:p15="http://schemas.microsoft.com/office/powerpoint/2012/main">
   <p:cSld>
     <p:spTree>
       <p:nvGrpSpPr>
-        <p:cNvPr id="104" name="Shape 104"/>
+        <p:cNvPr id="111" name="Shape 111"/>
         <p:cNvGrpSpPr/>
         <p:nvPr/>
       </p:nvGrpSpPr>
@@ -9320,7 +9572,7 @@
       </p:grpSpPr>
       <p:sp>
         <p:nvSpPr>
-          <p:cNvPr id="105" name="Google Shape;105;p17"/>
+          <p:cNvPr id="112" name="Google Shape;112;p18"/>
           <p:cNvSpPr txBox="1"/>
           <p:nvPr>
             <p:ph idx="1" type="body"/>
@@ -9351,7 +9603,7 @@
               <a:buNone/>
             </a:pPr>
             <a:r>
-              <a:rPr lang="en" sz="2400"/>
+              <a:rPr lang="da" sz="2400"/>
               <a:t>Efficiently connects consumers to manufacturers</a:t>
             </a:r>
             <a:endParaRPr sz="2400"/>
@@ -9382,7 +9634,7 @@
               <a:buNone/>
             </a:pPr>
             <a:r>
-              <a:rPr lang="en" sz="2400"/>
+              <a:rPr lang="da" sz="2400"/>
               <a:t>Subscription based model for purchasing goods</a:t>
             </a:r>
             <a:endParaRPr sz="2400"/>
@@ -9391,7 +9643,7 @@
       </p:sp>
       <p:pic>
         <p:nvPicPr>
-          <p:cNvPr id="106" name="Google Shape;106;p17"/>
+          <p:cNvPr id="113" name="Google Shape;113;p18"/>
           <p:cNvPicPr preferRelativeResize="0"/>
           <p:nvPr/>
         </p:nvPicPr>
@@ -9425,12 +9677,12 @@
 </p:sld>
 </file>
 
-<file path=ppt/slides/slide3.xml><?xml version="1.0" encoding="utf-8"?>
+<file path=ppt/slides/slide4.xml><?xml version="1.0" encoding="utf-8"?>
 <p:sld xmlns:a="http://schemas.openxmlformats.org/drawingml/2006/main" xmlns:r="http://schemas.openxmlformats.org/officeDocument/2006/relationships" xmlns:mc="http://schemas.openxmlformats.org/markup-compatibility/2006" xmlns:mv="urn:schemas-microsoft-com:mac:vml" xmlns:p="http://schemas.openxmlformats.org/presentationml/2006/main" xmlns:c="http://schemas.openxmlformats.org/drawingml/2006/chart" xmlns:dgm="http://schemas.openxmlformats.org/drawingml/2006/diagram" xmlns:o="urn:schemas-microsoft-com:office:office" xmlns:v="urn:schemas-microsoft-com:vml" xmlns:pvml="urn:schemas-microsoft-com:office:powerpoint" xmlns:com="http://schemas.openxmlformats.org/drawingml/2006/compatibility" xmlns:p14="http://schemas.microsoft.com/office/powerpoint/2010/main" xmlns:p15="http://schemas.microsoft.com/office/powerpoint/2012/main">
   <p:cSld>
     <p:spTree>
       <p:nvGrpSpPr>
-        <p:cNvPr id="110" name="Shape 110"/>
+        <p:cNvPr id="117" name="Shape 117"/>
         <p:cNvGrpSpPr/>
         <p:nvPr/>
       </p:nvGrpSpPr>
@@ -9444,7 +9696,7 @@
       </p:grpSpPr>
       <p:pic>
         <p:nvPicPr>
-          <p:cNvPr id="111" name="Google Shape;111;p18"/>
+          <p:cNvPr id="118" name="Google Shape;118;p19"/>
           <p:cNvPicPr preferRelativeResize="0"/>
           <p:nvPr/>
         </p:nvPicPr>
@@ -9471,7 +9723,7 @@
       </p:pic>
       <p:sp>
         <p:nvSpPr>
-          <p:cNvPr id="112" name="Google Shape;112;p18"/>
+          <p:cNvPr id="119" name="Google Shape;119;p19"/>
           <p:cNvSpPr txBox="1"/>
           <p:nvPr>
             <p:ph type="ctrTitle"/>
@@ -9502,11 +9754,11 @@
               <a:buNone/>
             </a:pPr>
             <a:r>
-              <a:rPr lang="en"/>
+              <a:rPr lang="da"/>
               <a:t>Users enroll on a subscription plan for the manufacturers</a:t>
             </a:r>
             <a:r>
-              <a:rPr lang="en"/>
+              <a:rPr lang="da"/>
               <a:t> products</a:t>
             </a:r>
             <a:endParaRPr/>
@@ -9521,12 +9773,12 @@
 </p:sld>
 </file>
 
-<file path=ppt/slides/slide4.xml><?xml version="1.0" encoding="utf-8"?>
+<file path=ppt/slides/slide5.xml><?xml version="1.0" encoding="utf-8"?>
 <p:sld xmlns:a="http://schemas.openxmlformats.org/drawingml/2006/main" xmlns:r="http://schemas.openxmlformats.org/officeDocument/2006/relationships" xmlns:mc="http://schemas.openxmlformats.org/markup-compatibility/2006" xmlns:mv="urn:schemas-microsoft-com:mac:vml" xmlns:p="http://schemas.openxmlformats.org/presentationml/2006/main" xmlns:c="http://schemas.openxmlformats.org/drawingml/2006/chart" xmlns:dgm="http://schemas.openxmlformats.org/drawingml/2006/diagram" xmlns:o="urn:schemas-microsoft-com:office:office" xmlns:v="urn:schemas-microsoft-com:vml" xmlns:pvml="urn:schemas-microsoft-com:office:powerpoint" xmlns:com="http://schemas.openxmlformats.org/drawingml/2006/compatibility" xmlns:p14="http://schemas.microsoft.com/office/powerpoint/2010/main" xmlns:p15="http://schemas.microsoft.com/office/powerpoint/2012/main">
   <p:cSld>
     <p:spTree>
       <p:nvGrpSpPr>
-        <p:cNvPr id="116" name="Shape 116"/>
+        <p:cNvPr id="123" name="Shape 123"/>
         <p:cNvGrpSpPr/>
         <p:nvPr/>
       </p:nvGrpSpPr>
@@ -9540,7 +9792,7 @@
       </p:grpSpPr>
       <p:sp>
         <p:nvSpPr>
-          <p:cNvPr id="117" name="Google Shape;117;p19"/>
+          <p:cNvPr id="124" name="Google Shape;124;p20"/>
           <p:cNvSpPr txBox="1"/>
           <p:nvPr>
             <p:ph type="ctrTitle"/>
@@ -9579,7 +9831,7 @@
       </p:sp>
       <p:pic>
         <p:nvPicPr>
-          <p:cNvPr id="118" name="Google Shape;118;p19"/>
+          <p:cNvPr id="125" name="Google Shape;125;p20"/>
           <p:cNvPicPr preferRelativeResize="0"/>
           <p:nvPr/>
         </p:nvPicPr>
@@ -9613,12 +9865,12 @@
 </p:sld>
 </file>
 
-<file path=ppt/slides/slide5.xml><?xml version="1.0" encoding="utf-8"?>
+<file path=ppt/slides/slide6.xml><?xml version="1.0" encoding="utf-8"?>
 <p:sld xmlns:a="http://schemas.openxmlformats.org/drawingml/2006/main" xmlns:r="http://schemas.openxmlformats.org/officeDocument/2006/relationships" xmlns:mc="http://schemas.openxmlformats.org/markup-compatibility/2006" xmlns:mv="urn:schemas-microsoft-com:mac:vml" xmlns:p="http://schemas.openxmlformats.org/presentationml/2006/main" xmlns:c="http://schemas.openxmlformats.org/drawingml/2006/chart" xmlns:dgm="http://schemas.openxmlformats.org/drawingml/2006/diagram" xmlns:o="urn:schemas-microsoft-com:office:office" xmlns:v="urn:schemas-microsoft-com:vml" xmlns:pvml="urn:schemas-microsoft-com:office:powerpoint" xmlns:com="http://schemas.openxmlformats.org/drawingml/2006/compatibility" xmlns:p14="http://schemas.microsoft.com/office/powerpoint/2010/main" xmlns:p15="http://schemas.microsoft.com/office/powerpoint/2012/main">
   <p:cSld>
     <p:spTree>
       <p:nvGrpSpPr>
-        <p:cNvPr id="122" name="Shape 122"/>
+        <p:cNvPr id="129" name="Shape 129"/>
         <p:cNvGrpSpPr/>
         <p:nvPr/>
       </p:nvGrpSpPr>
@@ -9632,7 +9884,7 @@
       </p:grpSpPr>
       <p:pic>
         <p:nvPicPr>
-          <p:cNvPr id="123" name="Google Shape;123;p20"/>
+          <p:cNvPr id="130" name="Google Shape;130;p21"/>
           <p:cNvPicPr preferRelativeResize="0"/>
           <p:nvPr/>
         </p:nvPicPr>
@@ -9659,7 +9911,7 @@
       </p:pic>
       <p:sp>
         <p:nvSpPr>
-          <p:cNvPr id="124" name="Google Shape;124;p20"/>
+          <p:cNvPr id="131" name="Google Shape;131;p21"/>
           <p:cNvSpPr txBox="1"/>
           <p:nvPr>
             <p:ph type="title"/>
@@ -9690,7 +9942,7 @@
               <a:buNone/>
             </a:pPr>
             <a:r>
-              <a:rPr lang="en"/>
+              <a:rPr lang="da"/>
               <a:t>Consumers checkout goods on the cart and an api call is sent to a third-party logistics company for delivery</a:t>
             </a:r>
             <a:endParaRPr/>

</xml_diff>